<commit_message>
added target users to ppt
</commit_message>
<xml_diff>
--- a/CookWithMe.pptx
+++ b/CookWithMe.pptx
@@ -8,11 +8,11 @@
   <p:sldIdLst>
     <p:sldId id="256" r:id="rId3"/>
     <p:sldId id="257" r:id="rId4"/>
-    <p:sldId id="259" r:id="rId5"/>
-    <p:sldId id="260" r:id="rId6"/>
-    <p:sldId id="261" r:id="rId7"/>
-    <p:sldId id="262" r:id="rId8"/>
-    <p:sldId id="263" r:id="rId9"/>
+    <p:sldId id="274" r:id="rId5"/>
+    <p:sldId id="259" r:id="rId6"/>
+    <p:sldId id="260" r:id="rId7"/>
+    <p:sldId id="261" r:id="rId8"/>
+    <p:sldId id="262" r:id="rId9"/>
     <p:sldId id="265" r:id="rId10"/>
     <p:sldId id="266" r:id="rId11"/>
     <p:sldId id="267" r:id="rId12"/>
@@ -9271,28 +9271,165 @@
             </a:lvl9pPr>
           </a:lstStyle>
           <a:p>
-            <a:r>
-              <a:rPr lang="en-US" dirty="0"/>
+            <a:pPr marL="285750" marR="0" lvl="0" indent="-285750" algn="l" defTabSz="457200" rtl="0" eaLnBrk="1" fontAlgn="auto" latinLnBrk="0" hangingPunct="1">
+              <a:lnSpc>
+                <a:spcPct val="100000"/>
+              </a:lnSpc>
+              <a:spcBef>
+                <a:spcPct val="20000"/>
+              </a:spcBef>
+              <a:spcAft>
+                <a:spcPts val="600"/>
+              </a:spcAft>
+              <a:buClr>
+                <a:srgbClr val="83992A"/>
+              </a:buClr>
+              <a:buSzPct val="115000"/>
+              <a:buFont typeface="Arial"/>
+              <a:buChar char="•"/>
+              <a:tabLst/>
+              <a:defRPr/>
+            </a:pPr>
+            <a:r>
+              <a:rPr kumimoji="0" lang="en-US" sz="2400" b="0" i="0" u="none" strike="noStrike" kern="1200" cap="none" spc="0" normalizeH="0" baseline="0" noProof="0" dirty="0">
+                <a:ln>
+                  <a:noFill/>
+                </a:ln>
+                <a:solidFill>
+                  <a:prstClr val="black">
+                    <a:lumMod val="85000"/>
+                    <a:lumOff val="15000"/>
+                  </a:prstClr>
+                </a:solidFill>
+                <a:effectLst/>
+                <a:uLnTx/>
+                <a:uFillTx/>
+                <a:latin typeface="Garamond" panose="02020404030301010803"/>
+                <a:ea typeface="+mn-ea"/>
+                <a:cs typeface="+mn-cs"/>
+              </a:rPr>
               <a:t>Most of the members cook for need </a:t>
             </a:r>
           </a:p>
           <a:p>
-            <a:r>
-              <a:rPr lang="en-US" dirty="0"/>
+            <a:pPr marL="285750" marR="0" lvl="0" indent="-285750" algn="l" defTabSz="457200" rtl="0" eaLnBrk="1" fontAlgn="auto" latinLnBrk="0" hangingPunct="1">
+              <a:lnSpc>
+                <a:spcPct val="100000"/>
+              </a:lnSpc>
+              <a:spcBef>
+                <a:spcPct val="20000"/>
+              </a:spcBef>
+              <a:spcAft>
+                <a:spcPts val="600"/>
+              </a:spcAft>
+              <a:buClr>
+                <a:srgbClr val="83992A"/>
+              </a:buClr>
+              <a:buSzPct val="115000"/>
+              <a:buFont typeface="Arial"/>
+              <a:buChar char="•"/>
+              <a:tabLst/>
+              <a:defRPr/>
+            </a:pPr>
+            <a:r>
+              <a:rPr kumimoji="0" lang="en-US" sz="2400" b="0" i="0" u="none" strike="noStrike" kern="1200" cap="none" spc="0" normalizeH="0" baseline="0" noProof="0" dirty="0">
+                <a:ln>
+                  <a:noFill/>
+                </a:ln>
+                <a:solidFill>
+                  <a:prstClr val="black">
+                    <a:lumMod val="85000"/>
+                    <a:lumOff val="15000"/>
+                  </a:prstClr>
+                </a:solidFill>
+                <a:effectLst/>
+                <a:uLnTx/>
+                <a:uFillTx/>
+                <a:latin typeface="Garamond" panose="02020404030301010803"/>
+                <a:ea typeface="+mn-ea"/>
+                <a:cs typeface="+mn-cs"/>
+              </a:rPr>
               <a:t>They find recipes giallozafferano.it, </a:t>
             </a:r>
             <a:r>
-              <a:rPr lang="en-US" dirty="0" err="1"/>
+              <a:rPr kumimoji="0" lang="en-US" sz="2400" b="0" i="0" u="none" strike="noStrike" kern="1200" cap="none" spc="0" normalizeH="0" baseline="0" noProof="0" dirty="0" err="1">
+                <a:ln>
+                  <a:noFill/>
+                </a:ln>
+                <a:solidFill>
+                  <a:prstClr val="black">
+                    <a:lumMod val="85000"/>
+                    <a:lumOff val="15000"/>
+                  </a:prstClr>
+                </a:solidFill>
+                <a:effectLst/>
+                <a:uLnTx/>
+                <a:uFillTx/>
+                <a:latin typeface="Garamond" panose="02020404030301010803"/>
+                <a:ea typeface="+mn-ea"/>
+                <a:cs typeface="+mn-cs"/>
+              </a:rPr>
               <a:t>Youtube</a:t>
             </a:r>
             <a:r>
-              <a:rPr lang="en-US" dirty="0"/>
+              <a:rPr kumimoji="0" lang="en-US" sz="2400" b="0" i="0" u="none" strike="noStrike" kern="1200" cap="none" spc="0" normalizeH="0" baseline="0" noProof="0" dirty="0">
+                <a:ln>
+                  <a:noFill/>
+                </a:ln>
+                <a:solidFill>
+                  <a:prstClr val="black">
+                    <a:lumMod val="85000"/>
+                    <a:lumOff val="15000"/>
+                  </a:prstClr>
+                </a:solidFill>
+                <a:effectLst/>
+                <a:uLnTx/>
+                <a:uFillTx/>
+                <a:latin typeface="Garamond" panose="02020404030301010803"/>
+                <a:ea typeface="+mn-ea"/>
+                <a:cs typeface="+mn-cs"/>
+              </a:rPr>
               <a:t>, chefincamicia.com, mysia.info</a:t>
             </a:r>
           </a:p>
           <a:p>
-            <a:r>
-              <a:rPr lang="en-US" dirty="0"/>
+            <a:pPr marL="285750" marR="0" lvl="0" indent="-285750" algn="l" defTabSz="457200" rtl="0" eaLnBrk="1" fontAlgn="auto" latinLnBrk="0" hangingPunct="1">
+              <a:lnSpc>
+                <a:spcPct val="100000"/>
+              </a:lnSpc>
+              <a:spcBef>
+                <a:spcPct val="20000"/>
+              </a:spcBef>
+              <a:spcAft>
+                <a:spcPts val="600"/>
+              </a:spcAft>
+              <a:buClr>
+                <a:srgbClr val="83992A"/>
+              </a:buClr>
+              <a:buSzPct val="115000"/>
+              <a:buFont typeface="Arial"/>
+              <a:buChar char="•"/>
+              <a:tabLst/>
+              <a:defRPr/>
+            </a:pPr>
+            <a:r>
+              <a:rPr kumimoji="0" lang="en-US" sz="2400" b="0" i="0" u="none" strike="noStrike" kern="1200" cap="none" spc="0" normalizeH="0" baseline="0" noProof="0" dirty="0">
+                <a:ln>
+                  <a:noFill/>
+                </a:ln>
+                <a:solidFill>
+                  <a:prstClr val="black">
+                    <a:lumMod val="85000"/>
+                    <a:lumOff val="15000"/>
+                  </a:prstClr>
+                </a:solidFill>
+                <a:effectLst/>
+                <a:uLnTx/>
+                <a:uFillTx/>
+                <a:latin typeface="Garamond" panose="02020404030301010803"/>
+                <a:ea typeface="+mn-ea"/>
+                <a:cs typeface="+mn-cs"/>
+              </a:rPr>
               <a:t>All of them struggles to combine ingredient sometimes</a:t>
             </a:r>
           </a:p>
@@ -9326,8 +9463,38 @@
           </a:bodyPr>
           <a:lstStyle/>
           <a:p>
-            <a:r>
-              <a:rPr lang="en-GB" sz="2000" b="1" dirty="0"/>
+            <a:pPr marL="0" marR="0" lvl="0" indent="0" algn="l" defTabSz="914400" rtl="0" eaLnBrk="1" fontAlgn="auto" latinLnBrk="0" hangingPunct="1">
+              <a:lnSpc>
+                <a:spcPct val="100000"/>
+              </a:lnSpc>
+              <a:spcBef>
+                <a:spcPts val="0"/>
+              </a:spcBef>
+              <a:spcAft>
+                <a:spcPts val="0"/>
+              </a:spcAft>
+              <a:buClrTx/>
+              <a:buSzTx/>
+              <a:buFontTx/>
+              <a:buNone/>
+              <a:tabLst/>
+              <a:defRPr/>
+            </a:pPr>
+            <a:r>
+              <a:rPr kumimoji="0" lang="en-GB" sz="2000" b="1" i="0" u="none" strike="noStrike" kern="1200" cap="none" spc="0" normalizeH="0" baseline="0" noProof="0" dirty="0">
+                <a:ln>
+                  <a:noFill/>
+                </a:ln>
+                <a:solidFill>
+                  <a:prstClr val="black"/>
+                </a:solidFill>
+                <a:effectLst/>
+                <a:uLnTx/>
+                <a:uFillTx/>
+                <a:latin typeface="Garamond" panose="02020404030301010803"/>
+                <a:ea typeface="+mn-ea"/>
+                <a:cs typeface="+mn-cs"/>
+              </a:rPr>
               <a:t>Questions</a:t>
             </a:r>
           </a:p>
@@ -9361,8 +9528,38 @@
           </a:bodyPr>
           <a:lstStyle/>
           <a:p>
-            <a:r>
-              <a:rPr lang="en-GB" sz="2000" b="1" dirty="0"/>
+            <a:pPr marL="0" marR="0" lvl="0" indent="0" algn="l" defTabSz="914400" rtl="0" eaLnBrk="1" fontAlgn="auto" latinLnBrk="0" hangingPunct="1">
+              <a:lnSpc>
+                <a:spcPct val="100000"/>
+              </a:lnSpc>
+              <a:spcBef>
+                <a:spcPts val="0"/>
+              </a:spcBef>
+              <a:spcAft>
+                <a:spcPts val="0"/>
+              </a:spcAft>
+              <a:buClrTx/>
+              <a:buSzTx/>
+              <a:buFontTx/>
+              <a:buNone/>
+              <a:tabLst/>
+              <a:defRPr/>
+            </a:pPr>
+            <a:r>
+              <a:rPr kumimoji="0" lang="en-GB" sz="2000" b="1" i="0" u="none" strike="noStrike" kern="1200" cap="none" spc="0" normalizeH="0" baseline="0" noProof="0" dirty="0">
+                <a:ln>
+                  <a:noFill/>
+                </a:ln>
+                <a:solidFill>
+                  <a:prstClr val="black"/>
+                </a:solidFill>
+                <a:effectLst/>
+                <a:uLnTx/>
+                <a:uFillTx/>
+                <a:latin typeface="Garamond" panose="02020404030301010803"/>
+                <a:ea typeface="+mn-ea"/>
+                <a:cs typeface="+mn-cs"/>
+              </a:rPr>
               <a:t>Answers</a:t>
             </a:r>
           </a:p>
@@ -9371,7 +9568,7 @@
     </p:spTree>
     <p:extLst>
       <p:ext uri="{BB962C8B-B14F-4D97-AF65-F5344CB8AC3E}">
-        <p14:creationId xmlns:p14="http://schemas.microsoft.com/office/powerpoint/2010/main" val="3353605121"/>
+        <p14:creationId xmlns:p14="http://schemas.microsoft.com/office/powerpoint/2010/main" val="411639793"/>
       </p:ext>
     </p:extLst>
   </p:cSld>
@@ -9468,7 +9665,7 @@
     </p:spTree>
     <p:extLst>
       <p:ext uri="{BB962C8B-B14F-4D97-AF65-F5344CB8AC3E}">
-        <p14:creationId xmlns:p14="http://schemas.microsoft.com/office/powerpoint/2010/main" val="794760701"/>
+        <p14:creationId xmlns:p14="http://schemas.microsoft.com/office/powerpoint/2010/main" val="3707567470"/>
       </p:ext>
     </p:extLst>
   </p:cSld>
@@ -9585,7 +9782,7 @@
     </p:spTree>
     <p:extLst>
       <p:ext uri="{BB962C8B-B14F-4D97-AF65-F5344CB8AC3E}">
-        <p14:creationId xmlns:p14="http://schemas.microsoft.com/office/powerpoint/2010/main" val="2686289215"/>
+        <p14:creationId xmlns:p14="http://schemas.microsoft.com/office/powerpoint/2010/main" val="1191548828"/>
       </p:ext>
     </p:extLst>
   </p:cSld>
@@ -9695,7 +9892,7 @@
     </p:spTree>
     <p:extLst>
       <p:ext uri="{BB962C8B-B14F-4D97-AF65-F5344CB8AC3E}">
-        <p14:creationId xmlns:p14="http://schemas.microsoft.com/office/powerpoint/2010/main" val="1098454404"/>
+        <p14:creationId xmlns:p14="http://schemas.microsoft.com/office/powerpoint/2010/main" val="3974973235"/>
       </p:ext>
     </p:extLst>
   </p:cSld>
@@ -9799,7 +9996,7 @@
     </p:spTree>
     <p:extLst>
       <p:ext uri="{BB962C8B-B14F-4D97-AF65-F5344CB8AC3E}">
-        <p14:creationId xmlns:p14="http://schemas.microsoft.com/office/powerpoint/2010/main" val="1196896929"/>
+        <p14:creationId xmlns:p14="http://schemas.microsoft.com/office/powerpoint/2010/main" val="3288502427"/>
       </p:ext>
     </p:extLst>
   </p:cSld>
@@ -9898,7 +10095,7 @@
     </p:spTree>
     <p:extLst>
       <p:ext uri="{BB962C8B-B14F-4D97-AF65-F5344CB8AC3E}">
-        <p14:creationId xmlns:p14="http://schemas.microsoft.com/office/powerpoint/2010/main" val="1436672699"/>
+        <p14:creationId xmlns:p14="http://schemas.microsoft.com/office/powerpoint/2010/main" val="1545865788"/>
       </p:ext>
     </p:extLst>
   </p:cSld>
@@ -9997,7 +10194,7 @@
     </p:spTree>
     <p:extLst>
       <p:ext uri="{BB962C8B-B14F-4D97-AF65-F5344CB8AC3E}">
-        <p14:creationId xmlns:p14="http://schemas.microsoft.com/office/powerpoint/2010/main" val="81556081"/>
+        <p14:creationId xmlns:p14="http://schemas.microsoft.com/office/powerpoint/2010/main" val="2023179001"/>
       </p:ext>
     </p:extLst>
   </p:cSld>
@@ -10547,6 +10744,240 @@
           <a:lstStyle/>
           <a:p>
             <a:r>
+              <a:rPr lang="it-IT" dirty="0"/>
+              <a:t>Target Users</a:t>
+            </a:r>
+          </a:p>
+        </p:txBody>
+      </p:sp>
+      <p:sp>
+        <p:nvSpPr>
+          <p:cNvPr id="11" name="Segnaposto contenuto 10">
+            <a:extLst>
+              <a:ext uri="{FF2B5EF4-FFF2-40B4-BE49-F238E27FC236}">
+                <a16:creationId xmlns:a16="http://schemas.microsoft.com/office/drawing/2014/main" id="{81400C55-95CF-467A-94BA-7919C6ACC256}"/>
+              </a:ext>
+            </a:extLst>
+          </p:cNvPr>
+          <p:cNvSpPr>
+            <a:spLocks noGrp="1"/>
+          </p:cNvSpPr>
+          <p:nvPr>
+            <p:ph sz="half" idx="1"/>
+          </p:nvPr>
+        </p:nvSpPr>
+        <p:spPr/>
+        <p:txBody>
+          <a:bodyPr>
+            <a:normAutofit/>
+          </a:bodyPr>
+          <a:lstStyle/>
+          <a:p>
+            <a:r>
+              <a:rPr lang="en-US" sz="2800" dirty="0"/>
+              <a:t>Age: 18 – 30</a:t>
+            </a:r>
+          </a:p>
+          <a:p>
+            <a:r>
+              <a:rPr lang="en-US" sz="2800" dirty="0"/>
+              <a:t>Gender: male and female</a:t>
+            </a:r>
+          </a:p>
+          <a:p>
+            <a:r>
+              <a:rPr lang="en-US" sz="2800" dirty="0"/>
+              <a:t>Occupation: any</a:t>
+            </a:r>
+          </a:p>
+          <a:p>
+            <a:r>
+              <a:rPr lang="en-US" sz="2800" dirty="0"/>
+              <a:t>Education: any</a:t>
+            </a:r>
+          </a:p>
+          <a:p>
+            <a:pPr marL="0" indent="0">
+              <a:buNone/>
+            </a:pPr>
+            <a:endParaRPr lang="en-US" sz="2800" dirty="0"/>
+          </a:p>
+        </p:txBody>
+      </p:sp>
+      <p:sp>
+        <p:nvSpPr>
+          <p:cNvPr id="12" name="Segnaposto contenuto 11">
+            <a:extLst>
+              <a:ext uri="{FF2B5EF4-FFF2-40B4-BE49-F238E27FC236}">
+                <a16:creationId xmlns:a16="http://schemas.microsoft.com/office/drawing/2014/main" id="{EEDDB5CE-2413-49E9-B8C5-CB265A53D736}"/>
+              </a:ext>
+            </a:extLst>
+          </p:cNvPr>
+          <p:cNvSpPr>
+            <a:spLocks noGrp="1"/>
+          </p:cNvSpPr>
+          <p:nvPr>
+            <p:ph sz="half" idx="2"/>
+          </p:nvPr>
+        </p:nvSpPr>
+        <p:spPr/>
+        <p:txBody>
+          <a:bodyPr>
+            <a:normAutofit/>
+          </a:bodyPr>
+          <a:lstStyle/>
+          <a:p>
+            <a:r>
+              <a:rPr lang="en-US" sz="2800" dirty="0"/>
+              <a:t>Location: Italy</a:t>
+            </a:r>
+          </a:p>
+          <a:p>
+            <a:r>
+              <a:rPr lang="en-US" sz="2800" dirty="0"/>
+              <a:t>Technology: familiar with apps</a:t>
+            </a:r>
+          </a:p>
+          <a:p>
+            <a:r>
+              <a:rPr lang="en-US" sz="2800" dirty="0"/>
+              <a:t>Passion: cooking </a:t>
+            </a:r>
+          </a:p>
+          <a:p>
+            <a:endParaRPr lang="en-GB" sz="2800" dirty="0"/>
+          </a:p>
+        </p:txBody>
+      </p:sp>
+      <p:sp>
+        <p:nvSpPr>
+          <p:cNvPr id="7" name="Rectangle 3"/>
+          <p:cNvSpPr>
+            <a:spLocks noChangeArrowheads="1"/>
+          </p:cNvSpPr>
+          <p:nvPr/>
+        </p:nvSpPr>
+        <p:spPr bwMode="auto">
+          <a:xfrm>
+            <a:off x="0" y="102920"/>
+            <a:ext cx="65" cy="251359"/>
+          </a:xfrm>
+          <a:prstGeom prst="rect">
+            <a:avLst/>
+          </a:prstGeom>
+          <a:solidFill>
+            <a:srgbClr val="F8F9FA"/>
+          </a:solidFill>
+          <a:ln>
+            <a:noFill/>
+          </a:ln>
+          <a:effectLst/>
+          <a:extLst>
+            <a:ext uri="{91240B29-F687-4F45-9708-019B960494DF}">
+              <a14:hiddenLine xmlns:a14="http://schemas.microsoft.com/office/drawing/2010/main" w="9525">
+                <a:solidFill>
+                  <a:schemeClr val="tx1"/>
+                </a:solidFill>
+                <a:miter lim="800000"/>
+                <a:headEnd/>
+                <a:tailEnd/>
+              </a14:hiddenLine>
+            </a:ext>
+            <a:ext uri="{AF507438-7753-43E0-B8FC-AC1667EBCBE1}">
+              <a14:hiddenEffects xmlns:a14="http://schemas.microsoft.com/office/drawing/2010/main">
+                <a:effectLst>
+                  <a:outerShdw dist="35921" dir="2700000" algn="ctr" rotWithShape="0">
+                    <a:schemeClr val="bg2"/>
+                  </a:outerShdw>
+                </a:effectLst>
+              </a14:hiddenEffects>
+            </a:ext>
+          </a:extLst>
+        </p:spPr>
+        <p:txBody>
+          <a:bodyPr vert="horz" wrap="none" lIns="0" tIns="-12696" rIns="0" bIns="-12696" numCol="1" anchor="ctr" anchorCtr="0" compatLnSpc="1">
+            <a:prstTxWarp prst="textNoShape">
+              <a:avLst/>
+            </a:prstTxWarp>
+            <a:spAutoFit/>
+          </a:bodyPr>
+          <a:lstStyle/>
+          <a:p>
+            <a:pPr marL="0" marR="0" lvl="0" indent="0" algn="l" defTabSz="914400" rtl="0" eaLnBrk="0" fontAlgn="base" latinLnBrk="0" hangingPunct="0">
+              <a:lnSpc>
+                <a:spcPct val="100000"/>
+              </a:lnSpc>
+              <a:spcBef>
+                <a:spcPct val="0"/>
+              </a:spcBef>
+              <a:spcAft>
+                <a:spcPct val="0"/>
+              </a:spcAft>
+              <a:buClrTx/>
+              <a:buSzTx/>
+              <a:buFontTx/>
+              <a:buNone/>
+              <a:tabLst/>
+            </a:pPr>
+            <a:endParaRPr kumimoji="0" lang="it-IT" altLang="it-IT" sz="1800" b="0" i="0" u="none" strike="noStrike" cap="none" normalizeH="0" baseline="0" dirty="0">
+              <a:ln>
+                <a:noFill/>
+              </a:ln>
+              <a:solidFill>
+                <a:schemeClr val="tx1"/>
+              </a:solidFill>
+              <a:effectLst/>
+              <a:latin typeface="Arial" panose="020B0604020202020204" pitchFamily="34" charset="0"/>
+            </a:endParaRPr>
+          </a:p>
+        </p:txBody>
+      </p:sp>
+    </p:spTree>
+    <p:extLst>
+      <p:ext uri="{BB962C8B-B14F-4D97-AF65-F5344CB8AC3E}">
+        <p14:creationId xmlns:p14="http://schemas.microsoft.com/office/powerpoint/2010/main" val="3558806385"/>
+      </p:ext>
+    </p:extLst>
+  </p:cSld>
+  <p:clrMapOvr>
+    <a:masterClrMapping/>
+  </p:clrMapOvr>
+</p:sld>
+</file>
+
+<file path=ppt/slides/slide4.xml><?xml version="1.0" encoding="utf-8"?>
+<p:sld xmlns:a="http://schemas.openxmlformats.org/drawingml/2006/main" xmlns:r="http://schemas.openxmlformats.org/officeDocument/2006/relationships" xmlns:p="http://schemas.openxmlformats.org/presentationml/2006/main">
+  <p:cSld>
+    <p:spTree>
+      <p:nvGrpSpPr>
+        <p:cNvPr id="1" name=""/>
+        <p:cNvGrpSpPr/>
+        <p:nvPr/>
+      </p:nvGrpSpPr>
+      <p:grpSpPr>
+        <a:xfrm>
+          <a:off x="0" y="0"/>
+          <a:ext cx="0" cy="0"/>
+          <a:chOff x="0" y="0"/>
+          <a:chExt cx="0" cy="0"/>
+        </a:xfrm>
+      </p:grpSpPr>
+      <p:sp>
+        <p:nvSpPr>
+          <p:cNvPr id="2" name="Titolo 1"/>
+          <p:cNvSpPr>
+            <a:spLocks noGrp="1"/>
+          </p:cNvSpPr>
+          <p:nvPr>
+            <p:ph type="title"/>
+          </p:nvPr>
+        </p:nvSpPr>
+        <p:spPr/>
+        <p:txBody>
+          <a:bodyPr/>
+          <a:lstStyle/>
+          <a:p>
+            <a:r>
               <a:rPr lang="it-IT" dirty="0" err="1"/>
               <a:t>Personas</a:t>
             </a:r>
@@ -11537,7 +11968,7 @@
 </p:sld>
 </file>
 
-<file path=ppt/slides/slide4.xml><?xml version="1.0" encoding="utf-8"?>
+<file path=ppt/slides/slide5.xml><?xml version="1.0" encoding="utf-8"?>
 <p:sld xmlns:a="http://schemas.openxmlformats.org/drawingml/2006/main" xmlns:r="http://schemas.openxmlformats.org/officeDocument/2006/relationships" xmlns:p="http://schemas.openxmlformats.org/presentationml/2006/main">
   <p:cSld>
     <p:spTree>
@@ -11593,16 +12024,363 @@
           </a:xfrm>
         </p:spPr>
         <p:txBody>
-          <a:bodyPr/>
+          <a:bodyPr>
+            <a:normAutofit fontScale="85000" lnSpcReduction="20000"/>
+          </a:bodyPr>
           <a:lstStyle/>
           <a:p>
+            <a:pPr marL="0" lvl="0" indent="0" defTabSz="914400" eaLnBrk="0" fontAlgn="base" hangingPunct="0">
+              <a:spcBef>
+                <a:spcPct val="0"/>
+              </a:spcBef>
+              <a:spcAft>
+                <a:spcPct val="0"/>
+              </a:spcAft>
+              <a:buClrTx/>
+              <a:buSzTx/>
+              <a:buNone/>
+            </a:pPr>
+            <a:r>
+              <a:rPr lang="en-US" dirty="0"/>
+              <a:t>It's Monday. Maria has just finished cleaning up the house and has no time to go to the supermarket because it is almost lunchtime and her children are returning home from school. </a:t>
+            </a:r>
+            <a:r>
+              <a:rPr lang="it-IT" altLang="it-IT" dirty="0"/>
+              <a:t>Maria </a:t>
+            </a:r>
+            <a:r>
+              <a:rPr lang="it-IT" altLang="it-IT" dirty="0" err="1"/>
+              <a:t>opens</a:t>
+            </a:r>
+            <a:r>
+              <a:rPr lang="it-IT" altLang="it-IT" dirty="0"/>
+              <a:t> the </a:t>
+            </a:r>
+            <a:r>
+              <a:rPr lang="it-IT" altLang="it-IT" dirty="0" err="1"/>
+              <a:t>fridge</a:t>
+            </a:r>
+            <a:r>
+              <a:rPr lang="it-IT" altLang="it-IT" dirty="0"/>
+              <a:t> and </a:t>
+            </a:r>
+            <a:r>
+              <a:rPr lang="it-IT" altLang="it-IT" dirty="0" err="1"/>
+              <a:t>pantry</a:t>
+            </a:r>
+            <a:r>
+              <a:rPr lang="it-IT" altLang="it-IT" dirty="0"/>
+              <a:t>. </a:t>
+            </a:r>
+            <a:r>
+              <a:rPr lang="it-IT" altLang="it-IT" dirty="0" err="1"/>
+              <a:t>She</a:t>
+            </a:r>
+            <a:r>
+              <a:rPr lang="it-IT" altLang="it-IT" dirty="0"/>
+              <a:t> </a:t>
+            </a:r>
+            <a:r>
+              <a:rPr lang="it-IT" altLang="it-IT" dirty="0" err="1"/>
+              <a:t>finds</a:t>
+            </a:r>
+            <a:r>
+              <a:rPr lang="it-IT" altLang="it-IT" dirty="0"/>
+              <a:t> </a:t>
+            </a:r>
+            <a:r>
+              <a:rPr lang="it-IT" altLang="it-IT" dirty="0" err="1"/>
+              <a:t>ham</a:t>
+            </a:r>
+            <a:r>
+              <a:rPr lang="it-IT" altLang="it-IT" dirty="0"/>
+              <a:t>, mozzarella, </a:t>
+            </a:r>
+            <a:r>
+              <a:rPr lang="it-IT" altLang="it-IT" dirty="0" err="1"/>
+              <a:t>courgettes</a:t>
+            </a:r>
+            <a:r>
+              <a:rPr lang="it-IT" altLang="it-IT" dirty="0"/>
+              <a:t>, cherry </a:t>
+            </a:r>
+            <a:r>
+              <a:rPr lang="it-IT" altLang="it-IT" dirty="0" err="1"/>
+              <a:t>tomatoes</a:t>
+            </a:r>
+            <a:r>
+              <a:rPr lang="it-IT" altLang="it-IT" dirty="0"/>
+              <a:t> and a </a:t>
+            </a:r>
+            <a:r>
+              <a:rPr lang="it-IT" altLang="it-IT" dirty="0" err="1"/>
+              <a:t>few</a:t>
+            </a:r>
+            <a:r>
+              <a:rPr lang="it-IT" altLang="it-IT" dirty="0"/>
+              <a:t> </a:t>
+            </a:r>
+            <a:r>
+              <a:rPr lang="it-IT" altLang="it-IT" dirty="0" err="1"/>
+              <a:t>eggs</a:t>
+            </a:r>
+            <a:r>
+              <a:rPr lang="it-IT" altLang="it-IT" dirty="0"/>
+              <a:t>. Mozzarella </a:t>
+            </a:r>
+            <a:r>
+              <a:rPr lang="it-IT" altLang="it-IT" dirty="0" err="1"/>
+              <a:t>would</a:t>
+            </a:r>
+            <a:r>
+              <a:rPr lang="it-IT" altLang="it-IT" dirty="0"/>
+              <a:t> be </a:t>
+            </a:r>
+            <a:r>
+              <a:rPr lang="it-IT" altLang="it-IT" dirty="0" err="1"/>
+              <a:t>good</a:t>
+            </a:r>
+            <a:r>
+              <a:rPr lang="it-IT" altLang="it-IT" dirty="0"/>
+              <a:t> to use </a:t>
+            </a:r>
+            <a:r>
+              <a:rPr lang="it-IT" altLang="it-IT" dirty="0" err="1"/>
+              <a:t>because</a:t>
+            </a:r>
+            <a:r>
+              <a:rPr lang="it-IT" altLang="it-IT" dirty="0"/>
+              <a:t> </a:t>
+            </a:r>
+            <a:r>
+              <a:rPr lang="it-IT" altLang="it-IT" dirty="0" err="1"/>
+              <a:t>it</a:t>
+            </a:r>
+            <a:r>
+              <a:rPr lang="it-IT" altLang="it-IT" dirty="0"/>
+              <a:t> </a:t>
+            </a:r>
+            <a:r>
+              <a:rPr lang="it-IT" altLang="it-IT" dirty="0" err="1"/>
+              <a:t>has</a:t>
+            </a:r>
+            <a:r>
+              <a:rPr lang="it-IT" altLang="it-IT" dirty="0"/>
+              <a:t> </a:t>
+            </a:r>
+            <a:r>
+              <a:rPr lang="it-IT" altLang="it-IT" dirty="0" err="1"/>
+              <a:t>already</a:t>
+            </a:r>
+            <a:r>
+              <a:rPr lang="it-IT" altLang="it-IT" dirty="0"/>
+              <a:t> </a:t>
+            </a:r>
+            <a:r>
+              <a:rPr lang="it-IT" altLang="it-IT" dirty="0" err="1"/>
+              <a:t>been</a:t>
+            </a:r>
+            <a:r>
+              <a:rPr lang="it-IT" altLang="it-IT" dirty="0"/>
+              <a:t> in the </a:t>
+            </a:r>
+            <a:r>
+              <a:rPr lang="it-IT" altLang="it-IT" dirty="0" err="1"/>
+              <a:t>fridge</a:t>
+            </a:r>
+            <a:r>
+              <a:rPr lang="it-IT" altLang="it-IT" dirty="0"/>
+              <a:t> for some time and </a:t>
+            </a:r>
+            <a:r>
+              <a:rPr lang="it-IT" altLang="it-IT" dirty="0" err="1"/>
+              <a:t>is</a:t>
+            </a:r>
+            <a:r>
+              <a:rPr lang="it-IT" altLang="it-IT" dirty="0"/>
+              <a:t> </a:t>
+            </a:r>
+            <a:r>
+              <a:rPr lang="it-IT" altLang="it-IT" dirty="0" err="1"/>
+              <a:t>likely</a:t>
+            </a:r>
+            <a:r>
+              <a:rPr lang="it-IT" altLang="it-IT" dirty="0"/>
+              <a:t> to go </a:t>
+            </a:r>
+            <a:r>
+              <a:rPr lang="it-IT" altLang="it-IT" dirty="0" err="1"/>
+              <a:t>bad</a:t>
+            </a:r>
+            <a:r>
+              <a:rPr lang="it-IT" altLang="it-IT" dirty="0"/>
+              <a:t>. </a:t>
+            </a:r>
+            <a:r>
+              <a:rPr lang="it-IT" altLang="it-IT" dirty="0" err="1"/>
+              <a:t>Nothing</a:t>
+            </a:r>
+            <a:r>
+              <a:rPr lang="it-IT" altLang="it-IT" dirty="0"/>
+              <a:t> </a:t>
+            </a:r>
+            <a:r>
+              <a:rPr lang="it-IT" altLang="it-IT" dirty="0" err="1"/>
+              <a:t>comes</a:t>
+            </a:r>
+            <a:r>
+              <a:rPr lang="it-IT" altLang="it-IT" dirty="0"/>
+              <a:t> to </a:t>
+            </a:r>
+            <a:r>
+              <a:rPr lang="it-IT" altLang="it-IT" dirty="0" err="1"/>
+              <a:t>mind</a:t>
+            </a:r>
+            <a:r>
+              <a:rPr lang="it-IT" altLang="it-IT" dirty="0"/>
+              <a:t> so </a:t>
+            </a:r>
+            <a:r>
+              <a:rPr lang="it-IT" altLang="it-IT" dirty="0" err="1"/>
+              <a:t>she</a:t>
+            </a:r>
+            <a:r>
+              <a:rPr lang="it-IT" altLang="it-IT" dirty="0"/>
+              <a:t> </a:t>
+            </a:r>
+            <a:r>
+              <a:rPr lang="it-IT" altLang="it-IT" dirty="0" err="1"/>
+              <a:t>tries</a:t>
+            </a:r>
+            <a:r>
+              <a:rPr lang="it-IT" altLang="it-IT" dirty="0"/>
+              <a:t> to </a:t>
+            </a:r>
+            <a:r>
+              <a:rPr lang="it-IT" altLang="it-IT" dirty="0" err="1"/>
+              <a:t>consult</a:t>
+            </a:r>
+            <a:r>
+              <a:rPr lang="it-IT" altLang="it-IT" dirty="0"/>
+              <a:t> some </a:t>
+            </a:r>
+            <a:r>
+              <a:rPr lang="it-IT" altLang="it-IT" dirty="0" err="1"/>
+              <a:t>recipe</a:t>
+            </a:r>
+            <a:r>
+              <a:rPr lang="it-IT" altLang="it-IT" dirty="0"/>
+              <a:t> site on the internet </a:t>
+            </a:r>
+            <a:r>
+              <a:rPr lang="it-IT" altLang="it-IT" dirty="0" err="1"/>
+              <a:t>but</a:t>
+            </a:r>
+            <a:r>
+              <a:rPr lang="it-IT" altLang="it-IT" dirty="0"/>
+              <a:t> </a:t>
+            </a:r>
+            <a:r>
+              <a:rPr lang="it-IT" altLang="it-IT" dirty="0" err="1"/>
+              <a:t>there</a:t>
+            </a:r>
+            <a:r>
+              <a:rPr lang="it-IT" altLang="it-IT" dirty="0"/>
+              <a:t> are </a:t>
+            </a:r>
+            <a:r>
+              <a:rPr lang="it-IT" altLang="it-IT" dirty="0" err="1"/>
+              <a:t>hundreds</a:t>
+            </a:r>
+            <a:r>
+              <a:rPr lang="it-IT" altLang="it-IT" dirty="0"/>
+              <a:t> of </a:t>
+            </a:r>
+            <a:r>
+              <a:rPr lang="it-IT" altLang="it-IT" dirty="0" err="1"/>
+              <a:t>recipes</a:t>
+            </a:r>
+            <a:r>
+              <a:rPr lang="it-IT" altLang="it-IT" dirty="0"/>
+              <a:t> and </a:t>
+            </a:r>
+            <a:r>
+              <a:rPr lang="it-IT" altLang="it-IT" dirty="0" err="1"/>
+              <a:t>she</a:t>
+            </a:r>
+            <a:r>
+              <a:rPr lang="it-IT" altLang="it-IT" dirty="0"/>
+              <a:t> </a:t>
+            </a:r>
+            <a:r>
+              <a:rPr lang="it-IT" altLang="it-IT" dirty="0" err="1"/>
+              <a:t>has</a:t>
+            </a:r>
+            <a:r>
+              <a:rPr lang="it-IT" altLang="it-IT" dirty="0"/>
+              <a:t> </a:t>
+            </a:r>
+            <a:r>
+              <a:rPr lang="it-IT" altLang="it-IT" dirty="0" err="1"/>
+              <a:t>little</a:t>
+            </a:r>
+            <a:r>
+              <a:rPr lang="it-IT" altLang="it-IT" dirty="0"/>
+              <a:t> time. In the end </a:t>
+            </a:r>
+            <a:r>
+              <a:rPr lang="it-IT" altLang="it-IT" dirty="0" err="1"/>
+              <a:t>she</a:t>
+            </a:r>
+            <a:r>
+              <a:rPr lang="it-IT" altLang="it-IT" dirty="0"/>
+              <a:t> </a:t>
+            </a:r>
+            <a:r>
+              <a:rPr lang="it-IT" altLang="it-IT" dirty="0" err="1"/>
+              <a:t>decides</a:t>
+            </a:r>
+            <a:r>
+              <a:rPr lang="it-IT" altLang="it-IT" dirty="0"/>
+              <a:t> to do the </a:t>
+            </a:r>
+            <a:r>
+              <a:rPr lang="it-IT" altLang="it-IT" dirty="0" err="1"/>
+              <a:t>usual</a:t>
+            </a:r>
+            <a:r>
+              <a:rPr lang="it-IT" altLang="it-IT" dirty="0"/>
+              <a:t> tomato pasta and mozzarella. Tomorrow </a:t>
+            </a:r>
+            <a:r>
+              <a:rPr lang="it-IT" altLang="it-IT" dirty="0" err="1"/>
+              <a:t>it</a:t>
+            </a:r>
+            <a:r>
+              <a:rPr lang="it-IT" altLang="it-IT" dirty="0"/>
+              <a:t> </a:t>
+            </a:r>
+            <a:r>
+              <a:rPr lang="it-IT" altLang="it-IT" dirty="0" err="1"/>
+              <a:t>will</a:t>
+            </a:r>
+            <a:r>
+              <a:rPr lang="it-IT" altLang="it-IT" dirty="0"/>
+              <a:t> be </a:t>
+            </a:r>
+            <a:r>
+              <a:rPr lang="it-IT" altLang="it-IT" dirty="0" err="1"/>
+              <a:t>better</a:t>
+            </a:r>
+            <a:r>
+              <a:rPr lang="it-IT" altLang="it-IT" dirty="0"/>
+              <a:t>...</a:t>
+            </a:r>
+          </a:p>
+          <a:p>
             <a:pPr marL="0" indent="0">
               <a:buNone/>
             </a:pPr>
-            <a:r>
-              <a:rPr lang="en-US" dirty="0"/>
-              <a:t>It's Monday. Maria has just finished cleaning up the house and has no time to go to the supermarket because it is almost lunchtime and her children are returning home from school. And she doesn't want to trim the usual tomato pasta ...</a:t>
-            </a:r>
             <a:endParaRPr lang="it-IT" dirty="0"/>
           </a:p>
         </p:txBody>
@@ -11650,7 +12428,7 @@
 </p:sld>
 </file>
 
-<file path=ppt/slides/slide5.xml><?xml version="1.0" encoding="utf-8"?>
+<file path=ppt/slides/slide6.xml><?xml version="1.0" encoding="utf-8"?>
 <p:sld xmlns:a="http://schemas.openxmlformats.org/drawingml/2006/main" xmlns:r="http://schemas.openxmlformats.org/officeDocument/2006/relationships" xmlns:p="http://schemas.openxmlformats.org/presentationml/2006/main">
   <p:cSld>
     <p:spTree>
@@ -11702,196 +12480,457 @@
         <p:spPr>
           <a:xfrm>
             <a:off x="1295402" y="2580378"/>
-            <a:ext cx="4976445" cy="2437099"/>
+            <a:ext cx="5118461" cy="3183164"/>
           </a:xfrm>
         </p:spPr>
         <p:txBody>
-          <a:bodyPr/>
+          <a:bodyPr>
+            <a:normAutofit fontScale="85000" lnSpcReduction="10000"/>
+          </a:bodyPr>
           <a:lstStyle/>
           <a:p>
+            <a:pPr marL="0" lvl="0" indent="0" defTabSz="914400" eaLnBrk="0" fontAlgn="base" hangingPunct="0">
+              <a:spcBef>
+                <a:spcPct val="0"/>
+              </a:spcBef>
+              <a:spcAft>
+                <a:spcPct val="0"/>
+              </a:spcAft>
+              <a:buClrTx/>
+              <a:buSzTx/>
+              <a:buNone/>
+            </a:pPr>
+            <a:r>
+              <a:rPr lang="it-IT" altLang="it-IT" dirty="0"/>
+              <a:t>Fabio </a:t>
+            </a:r>
+            <a:r>
+              <a:rPr lang="it-IT" altLang="it-IT" dirty="0" err="1"/>
+              <a:t>woke</a:t>
+            </a:r>
+            <a:r>
+              <a:rPr lang="it-IT" altLang="it-IT" dirty="0"/>
+              <a:t> up late </a:t>
+            </a:r>
+            <a:r>
+              <a:rPr lang="it-IT" altLang="it-IT" dirty="0" err="1"/>
+              <a:t>this</a:t>
+            </a:r>
+            <a:r>
+              <a:rPr lang="it-IT" altLang="it-IT" dirty="0"/>
+              <a:t> </a:t>
+            </a:r>
+            <a:r>
+              <a:rPr lang="it-IT" altLang="it-IT" dirty="0" err="1"/>
+              <a:t>morning</a:t>
+            </a:r>
+            <a:r>
+              <a:rPr lang="it-IT" altLang="it-IT" dirty="0"/>
+              <a:t> </a:t>
+            </a:r>
+            <a:r>
+              <a:rPr lang="it-IT" altLang="it-IT" dirty="0" err="1"/>
+              <a:t>as</a:t>
+            </a:r>
+            <a:r>
+              <a:rPr lang="it-IT" altLang="it-IT" dirty="0"/>
+              <a:t> </a:t>
+            </a:r>
+            <a:r>
+              <a:rPr lang="it-IT" altLang="it-IT" dirty="0" err="1"/>
+              <a:t>yesterday</a:t>
+            </a:r>
+            <a:r>
+              <a:rPr lang="it-IT" altLang="it-IT" dirty="0"/>
+              <a:t> he </a:t>
+            </a:r>
+            <a:r>
+              <a:rPr lang="it-IT" altLang="it-IT" dirty="0" err="1"/>
+              <a:t>stayed</a:t>
+            </a:r>
+            <a:r>
+              <a:rPr lang="it-IT" altLang="it-IT" dirty="0"/>
+              <a:t> to play video games </a:t>
+            </a:r>
+            <a:r>
+              <a:rPr lang="it-IT" altLang="it-IT" dirty="0" err="1"/>
+              <a:t>until</a:t>
+            </a:r>
+            <a:r>
+              <a:rPr lang="it-IT" altLang="it-IT" dirty="0"/>
+              <a:t> late in the </a:t>
+            </a:r>
+            <a:r>
+              <a:rPr lang="it-IT" altLang="it-IT" dirty="0" err="1"/>
+              <a:t>evening</a:t>
+            </a:r>
+            <a:r>
+              <a:rPr lang="it-IT" altLang="it-IT" dirty="0"/>
+              <a:t>. In the </a:t>
+            </a:r>
+            <a:r>
+              <a:rPr lang="it-IT" altLang="it-IT" dirty="0" err="1"/>
+              <a:t>afternoon</a:t>
+            </a:r>
+            <a:r>
+              <a:rPr lang="it-IT" altLang="it-IT" dirty="0"/>
+              <a:t> he </a:t>
+            </a:r>
+            <a:r>
+              <a:rPr lang="it-IT" altLang="it-IT" dirty="0" err="1"/>
+              <a:t>has</a:t>
+            </a:r>
+            <a:r>
+              <a:rPr lang="it-IT" altLang="it-IT" dirty="0"/>
+              <a:t> to go to </a:t>
+            </a:r>
+            <a:r>
+              <a:rPr lang="it-IT" altLang="it-IT" dirty="0" err="1"/>
+              <a:t>university</a:t>
+            </a:r>
+            <a:r>
+              <a:rPr lang="it-IT" altLang="it-IT" dirty="0"/>
+              <a:t> for </a:t>
+            </a:r>
+            <a:r>
+              <a:rPr lang="it-IT" altLang="it-IT" dirty="0" err="1"/>
+              <a:t>courses</a:t>
+            </a:r>
+            <a:r>
+              <a:rPr lang="it-IT" altLang="it-IT" dirty="0"/>
+              <a:t> so he </a:t>
+            </a:r>
+            <a:r>
+              <a:rPr lang="it-IT" altLang="it-IT" dirty="0" err="1"/>
+              <a:t>has</a:t>
+            </a:r>
+            <a:r>
+              <a:rPr lang="it-IT" altLang="it-IT" dirty="0"/>
+              <a:t> to </a:t>
+            </a:r>
+            <a:r>
+              <a:rPr lang="it-IT" altLang="it-IT" dirty="0" err="1"/>
+              <a:t>hurry</a:t>
+            </a:r>
+            <a:r>
+              <a:rPr lang="it-IT" altLang="it-IT" dirty="0"/>
+              <a:t> up </a:t>
+            </a:r>
+            <a:r>
+              <a:rPr lang="it-IT" altLang="it-IT" dirty="0" err="1"/>
+              <a:t>as</a:t>
+            </a:r>
+            <a:r>
+              <a:rPr lang="it-IT" altLang="it-IT" dirty="0"/>
+              <a:t> he </a:t>
+            </a:r>
+            <a:r>
+              <a:rPr lang="it-IT" altLang="it-IT" dirty="0" err="1"/>
+              <a:t>has</a:t>
+            </a:r>
+            <a:r>
+              <a:rPr lang="it-IT" altLang="it-IT" dirty="0"/>
+              <a:t> to wash and </a:t>
+            </a:r>
+            <a:r>
+              <a:rPr lang="it-IT" altLang="it-IT" dirty="0" err="1"/>
+              <a:t>have</a:t>
+            </a:r>
+            <a:r>
+              <a:rPr lang="it-IT" altLang="it-IT" dirty="0"/>
+              <a:t> lunch. Fabio </a:t>
+            </a:r>
+            <a:r>
+              <a:rPr lang="it-IT" altLang="it-IT" dirty="0" err="1"/>
+              <a:t>hates</a:t>
+            </a:r>
+            <a:r>
+              <a:rPr lang="it-IT" altLang="it-IT" dirty="0"/>
+              <a:t> </a:t>
+            </a:r>
+            <a:r>
+              <a:rPr lang="it-IT" altLang="it-IT" dirty="0" err="1"/>
+              <a:t>cooking</a:t>
+            </a:r>
+            <a:r>
+              <a:rPr lang="it-IT" altLang="it-IT" dirty="0"/>
+              <a:t> and </a:t>
+            </a:r>
+            <a:r>
+              <a:rPr lang="it-IT" altLang="it-IT" dirty="0" err="1"/>
+              <a:t>has</a:t>
+            </a:r>
+            <a:r>
+              <a:rPr lang="it-IT" altLang="it-IT" dirty="0"/>
+              <a:t> </a:t>
+            </a:r>
+            <a:r>
+              <a:rPr lang="it-IT" altLang="it-IT" dirty="0" err="1"/>
+              <a:t>finished</a:t>
+            </a:r>
+            <a:r>
+              <a:rPr lang="it-IT" altLang="it-IT" dirty="0"/>
+              <a:t> </a:t>
+            </a:r>
+            <a:r>
+              <a:rPr lang="it-IT" altLang="it-IT" dirty="0" err="1"/>
+              <a:t>all</a:t>
+            </a:r>
+            <a:r>
+              <a:rPr lang="it-IT" altLang="it-IT" dirty="0"/>
+              <a:t> the </a:t>
+            </a:r>
+            <a:r>
+              <a:rPr lang="it-IT" altLang="it-IT" dirty="0" err="1"/>
+              <a:t>tuna</a:t>
+            </a:r>
+            <a:r>
+              <a:rPr lang="it-IT" altLang="it-IT" dirty="0"/>
+              <a:t> </a:t>
+            </a:r>
+            <a:r>
+              <a:rPr lang="it-IT" altLang="it-IT" dirty="0" err="1"/>
+              <a:t>cans</a:t>
+            </a:r>
+            <a:r>
+              <a:rPr lang="it-IT" altLang="it-IT" dirty="0"/>
+              <a:t> so he </a:t>
+            </a:r>
+            <a:r>
+              <a:rPr lang="it-IT" altLang="it-IT" dirty="0" err="1"/>
+              <a:t>is</a:t>
+            </a:r>
+            <a:r>
+              <a:rPr lang="it-IT" altLang="it-IT" dirty="0"/>
+              <a:t> </a:t>
+            </a:r>
+            <a:r>
+              <a:rPr lang="it-IT" altLang="it-IT" dirty="0" err="1"/>
+              <a:t>forced</a:t>
+            </a:r>
+            <a:r>
+              <a:rPr lang="it-IT" altLang="it-IT" dirty="0"/>
+              <a:t> to </a:t>
+            </a:r>
+            <a:r>
+              <a:rPr lang="it-IT" altLang="it-IT" dirty="0" err="1"/>
+              <a:t>invent</a:t>
+            </a:r>
+            <a:r>
+              <a:rPr lang="it-IT" altLang="it-IT" dirty="0"/>
+              <a:t> </a:t>
+            </a:r>
+            <a:r>
+              <a:rPr lang="it-IT" altLang="it-IT" dirty="0" err="1"/>
+              <a:t>something</a:t>
+            </a:r>
+            <a:r>
+              <a:rPr lang="it-IT" altLang="it-IT" dirty="0"/>
+              <a:t> </a:t>
+            </a:r>
+            <a:r>
+              <a:rPr lang="it-IT" altLang="it-IT" dirty="0" err="1"/>
+              <a:t>but</a:t>
+            </a:r>
+            <a:r>
+              <a:rPr lang="it-IT" altLang="it-IT" dirty="0"/>
+              <a:t>, </a:t>
+            </a:r>
+            <a:r>
+              <a:rPr lang="it-IT" altLang="it-IT" dirty="0" err="1"/>
+              <a:t>not</a:t>
+            </a:r>
+            <a:r>
+              <a:rPr lang="it-IT" altLang="it-IT" dirty="0"/>
+              <a:t> </a:t>
+            </a:r>
+            <a:r>
+              <a:rPr lang="it-IT" altLang="it-IT" dirty="0" err="1"/>
+              <a:t>having</a:t>
+            </a:r>
+            <a:r>
+              <a:rPr lang="it-IT" altLang="it-IT" dirty="0"/>
+              <a:t> so </a:t>
+            </a:r>
+            <a:r>
+              <a:rPr lang="it-IT" altLang="it-IT" dirty="0" err="1"/>
+              <a:t>much</a:t>
+            </a:r>
+            <a:r>
+              <a:rPr lang="it-IT" altLang="it-IT" dirty="0"/>
+              <a:t> </a:t>
+            </a:r>
+          </a:p>
+          <a:p>
+            <a:pPr marL="0" lvl="0" indent="0" defTabSz="914400" eaLnBrk="0" fontAlgn="base" hangingPunct="0">
+              <a:spcBef>
+                <a:spcPct val="0"/>
+              </a:spcBef>
+              <a:spcAft>
+                <a:spcPct val="0"/>
+              </a:spcAft>
+              <a:buClrTx/>
+              <a:buSzTx/>
+              <a:buNone/>
+            </a:pPr>
+            <a:r>
+              <a:rPr lang="it-IT" altLang="it-IT" dirty="0" err="1"/>
+              <a:t>imagination</a:t>
+            </a:r>
+            <a:r>
+              <a:rPr lang="it-IT" altLang="it-IT" dirty="0"/>
+              <a:t> in the </a:t>
+            </a:r>
+            <a:r>
+              <a:rPr lang="it-IT" altLang="it-IT" dirty="0" err="1"/>
+              <a:t>kitchen</a:t>
+            </a:r>
+            <a:r>
+              <a:rPr lang="it-IT" altLang="it-IT" dirty="0"/>
+              <a:t> and </a:t>
+            </a:r>
+            <a:r>
+              <a:rPr lang="it-IT" altLang="it-IT" dirty="0" err="1"/>
+              <a:t>few</a:t>
+            </a:r>
+            <a:r>
+              <a:rPr lang="it-IT" altLang="it-IT" dirty="0"/>
+              <a:t> </a:t>
+            </a:r>
+            <a:r>
+              <a:rPr lang="it-IT" altLang="it-IT" dirty="0" err="1"/>
+              <a:t>ingredients</a:t>
+            </a:r>
+            <a:r>
+              <a:rPr lang="it-IT" altLang="it-IT" dirty="0"/>
+              <a:t>, he </a:t>
+            </a:r>
+            <a:r>
+              <a:rPr lang="it-IT" altLang="it-IT" dirty="0" err="1"/>
+              <a:t>doesn't</a:t>
+            </a:r>
+            <a:r>
+              <a:rPr lang="it-IT" altLang="it-IT" dirty="0"/>
+              <a:t> </a:t>
+            </a:r>
+            <a:r>
+              <a:rPr lang="it-IT" altLang="it-IT" dirty="0" err="1"/>
+              <a:t>have</a:t>
+            </a:r>
+            <a:r>
+              <a:rPr lang="it-IT" altLang="it-IT" dirty="0"/>
+              <a:t> time to </a:t>
+            </a:r>
+            <a:r>
+              <a:rPr lang="it-IT" altLang="it-IT" dirty="0" err="1"/>
+              <a:t>think</a:t>
+            </a:r>
+            <a:r>
+              <a:rPr lang="it-IT" altLang="it-IT" dirty="0"/>
+              <a:t> </a:t>
+            </a:r>
+            <a:r>
+              <a:rPr lang="it-IT" altLang="it-IT" dirty="0" err="1"/>
+              <a:t>about</a:t>
+            </a:r>
+            <a:r>
+              <a:rPr lang="it-IT" altLang="it-IT" dirty="0"/>
+              <a:t> </a:t>
+            </a:r>
+            <a:r>
+              <a:rPr lang="it-IT" altLang="it-IT" dirty="0" err="1"/>
+              <a:t>what</a:t>
+            </a:r>
+            <a:r>
+              <a:rPr lang="it-IT" altLang="it-IT" dirty="0"/>
+              <a:t> to </a:t>
+            </a:r>
+            <a:r>
+              <a:rPr lang="it-IT" altLang="it-IT" dirty="0" err="1"/>
+              <a:t>cook</a:t>
+            </a:r>
+            <a:r>
+              <a:rPr lang="it-IT" altLang="it-IT" dirty="0"/>
+              <a:t> and </a:t>
+            </a:r>
+            <a:r>
+              <a:rPr lang="it-IT" altLang="it-IT" dirty="0" err="1"/>
+              <a:t>how</a:t>
+            </a:r>
+            <a:r>
+              <a:rPr lang="it-IT" altLang="it-IT" dirty="0"/>
+              <a:t> to </a:t>
+            </a:r>
+            <a:r>
+              <a:rPr lang="it-IT" altLang="it-IT" dirty="0" err="1"/>
+              <a:t>cook</a:t>
+            </a:r>
+            <a:r>
+              <a:rPr lang="it-IT" altLang="it-IT" dirty="0"/>
+              <a:t> </a:t>
+            </a:r>
+            <a:r>
+              <a:rPr lang="it-IT" altLang="it-IT" dirty="0" err="1"/>
+              <a:t>it</a:t>
+            </a:r>
+            <a:r>
+              <a:rPr lang="it-IT" altLang="it-IT" dirty="0"/>
+              <a:t> so he </a:t>
+            </a:r>
+            <a:r>
+              <a:rPr lang="it-IT" altLang="it-IT" dirty="0" err="1"/>
+              <a:t>decides</a:t>
+            </a:r>
+            <a:r>
+              <a:rPr lang="it-IT" altLang="it-IT" dirty="0"/>
+              <a:t> to </a:t>
+            </a:r>
+            <a:r>
+              <a:rPr lang="it-IT" altLang="it-IT" dirty="0" err="1"/>
+              <a:t>skip</a:t>
+            </a:r>
+            <a:r>
+              <a:rPr lang="it-IT" altLang="it-IT" dirty="0"/>
+              <a:t> lunch. </a:t>
+            </a:r>
+            <a:r>
+              <a:rPr lang="it-IT" altLang="it-IT" dirty="0" err="1"/>
+              <a:t>Today</a:t>
+            </a:r>
+            <a:r>
+              <a:rPr lang="it-IT" altLang="it-IT" dirty="0"/>
+              <a:t> Fabio </a:t>
+            </a:r>
+            <a:r>
+              <a:rPr lang="it-IT" altLang="it-IT" dirty="0" err="1"/>
+              <a:t>will</a:t>
+            </a:r>
+            <a:r>
+              <a:rPr lang="it-IT" altLang="it-IT" dirty="0"/>
+              <a:t> go to </a:t>
+            </a:r>
+            <a:r>
+              <a:rPr lang="it-IT" altLang="it-IT" dirty="0" err="1"/>
+              <a:t>university</a:t>
+            </a:r>
+            <a:r>
+              <a:rPr lang="it-IT" altLang="it-IT" dirty="0"/>
+              <a:t> </a:t>
+            </a:r>
+            <a:r>
+              <a:rPr lang="it-IT" altLang="it-IT" dirty="0" err="1"/>
+              <a:t>fasting</a:t>
+            </a:r>
+            <a:r>
+              <a:rPr lang="it-IT" altLang="it-IT" dirty="0"/>
+              <a:t>...</a:t>
+            </a:r>
+          </a:p>
+          <a:p>
             <a:pPr marL="0" indent="0">
               <a:buNone/>
             </a:pPr>
-            <a:r>
-              <a:rPr lang="it-IT" altLang="it-IT" dirty="0"/>
-              <a:t>Fabio </a:t>
-            </a:r>
-            <a:r>
-              <a:rPr lang="it-IT" altLang="it-IT" dirty="0" err="1"/>
-              <a:t>woke</a:t>
-            </a:r>
-            <a:r>
-              <a:rPr lang="it-IT" altLang="it-IT" dirty="0"/>
-              <a:t> up late </a:t>
-            </a:r>
-            <a:r>
-              <a:rPr lang="it-IT" altLang="it-IT" dirty="0" err="1"/>
-              <a:t>this</a:t>
-            </a:r>
-            <a:r>
-              <a:rPr lang="it-IT" altLang="it-IT" dirty="0"/>
-              <a:t> </a:t>
-            </a:r>
-            <a:r>
-              <a:rPr lang="it-IT" altLang="it-IT" dirty="0" err="1"/>
-              <a:t>morning</a:t>
-            </a:r>
-            <a:r>
-              <a:rPr lang="it-IT" altLang="it-IT" dirty="0"/>
-              <a:t> and in the </a:t>
-            </a:r>
-            <a:r>
-              <a:rPr lang="it-IT" altLang="it-IT" dirty="0" err="1"/>
-              <a:t>afternoon</a:t>
-            </a:r>
-            <a:r>
-              <a:rPr lang="it-IT" altLang="it-IT" dirty="0"/>
-              <a:t> he </a:t>
-            </a:r>
-            <a:r>
-              <a:rPr lang="it-IT" altLang="it-IT" dirty="0" err="1"/>
-              <a:t>has</a:t>
-            </a:r>
-            <a:r>
-              <a:rPr lang="it-IT" altLang="it-IT" dirty="0"/>
-              <a:t> to go to </a:t>
-            </a:r>
-            <a:r>
-              <a:rPr lang="it-IT" altLang="it-IT" dirty="0" err="1"/>
-              <a:t>university</a:t>
-            </a:r>
-            <a:r>
-              <a:rPr lang="it-IT" altLang="it-IT" dirty="0"/>
-              <a:t> for </a:t>
-            </a:r>
-            <a:r>
-              <a:rPr lang="it-IT" altLang="it-IT" dirty="0" err="1"/>
-              <a:t>courses</a:t>
-            </a:r>
-            <a:r>
-              <a:rPr lang="it-IT" altLang="it-IT" dirty="0"/>
-              <a:t>. He </a:t>
-            </a:r>
-            <a:r>
-              <a:rPr lang="it-IT" altLang="it-IT" dirty="0" err="1"/>
-              <a:t>hates</a:t>
-            </a:r>
-            <a:r>
-              <a:rPr lang="it-IT" altLang="it-IT" dirty="0"/>
-              <a:t> </a:t>
-            </a:r>
-            <a:r>
-              <a:rPr lang="it-IT" altLang="it-IT" dirty="0" err="1"/>
-              <a:t>cooking</a:t>
-            </a:r>
-            <a:r>
-              <a:rPr lang="it-IT" altLang="it-IT" dirty="0"/>
-              <a:t> </a:t>
-            </a:r>
-            <a:r>
-              <a:rPr lang="it-IT" altLang="it-IT" dirty="0" err="1"/>
-              <a:t>but</a:t>
-            </a:r>
-            <a:r>
-              <a:rPr lang="it-IT" altLang="it-IT" dirty="0"/>
-              <a:t> he </a:t>
-            </a:r>
-            <a:r>
-              <a:rPr lang="it-IT" altLang="it-IT" dirty="0" err="1"/>
-              <a:t>has</a:t>
-            </a:r>
-            <a:r>
-              <a:rPr lang="it-IT" altLang="it-IT" dirty="0"/>
-              <a:t> </a:t>
-            </a:r>
-            <a:r>
-              <a:rPr lang="it-IT" altLang="it-IT" dirty="0" err="1"/>
-              <a:t>finished</a:t>
-            </a:r>
-            <a:r>
-              <a:rPr lang="it-IT" altLang="it-IT" dirty="0"/>
-              <a:t> </a:t>
-            </a:r>
-            <a:r>
-              <a:rPr lang="it-IT" altLang="it-IT" dirty="0" err="1"/>
-              <a:t>all</a:t>
-            </a:r>
-            <a:r>
-              <a:rPr lang="it-IT" altLang="it-IT" dirty="0"/>
-              <a:t> the </a:t>
-            </a:r>
-            <a:r>
-              <a:rPr lang="it-IT" altLang="it-IT" dirty="0" err="1"/>
-              <a:t>tuna</a:t>
-            </a:r>
-            <a:r>
-              <a:rPr lang="it-IT" altLang="it-IT" dirty="0"/>
-              <a:t> </a:t>
-            </a:r>
-            <a:r>
-              <a:rPr lang="it-IT" altLang="it-IT" dirty="0" err="1"/>
-              <a:t>cans</a:t>
-            </a:r>
-            <a:r>
-              <a:rPr lang="it-IT" altLang="it-IT" dirty="0"/>
-              <a:t> and </a:t>
-            </a:r>
-            <a:r>
-              <a:rPr lang="it-IT" altLang="it-IT" dirty="0" err="1"/>
-              <a:t>has</a:t>
-            </a:r>
-            <a:r>
-              <a:rPr lang="it-IT" altLang="it-IT" dirty="0"/>
-              <a:t> no time to </a:t>
-            </a:r>
-            <a:r>
-              <a:rPr lang="it-IT" altLang="it-IT" dirty="0" err="1"/>
-              <a:t>think</a:t>
-            </a:r>
-            <a:r>
-              <a:rPr lang="it-IT" altLang="it-IT" dirty="0"/>
-              <a:t> </a:t>
-            </a:r>
-            <a:r>
-              <a:rPr lang="it-IT" altLang="it-IT" dirty="0" err="1"/>
-              <a:t>what</a:t>
-            </a:r>
-            <a:r>
-              <a:rPr lang="it-IT" altLang="it-IT" dirty="0"/>
-              <a:t> to </a:t>
-            </a:r>
-            <a:r>
-              <a:rPr lang="it-IT" altLang="it-IT" dirty="0" err="1"/>
-              <a:t>cook</a:t>
-            </a:r>
-            <a:r>
-              <a:rPr lang="it-IT" altLang="it-IT" dirty="0"/>
-              <a:t> and </a:t>
-            </a:r>
-            <a:r>
-              <a:rPr lang="it-IT" altLang="it-IT" dirty="0" err="1"/>
-              <a:t>how</a:t>
-            </a:r>
-            <a:r>
-              <a:rPr lang="it-IT" altLang="it-IT" dirty="0"/>
-              <a:t> to </a:t>
-            </a:r>
-            <a:r>
-              <a:rPr lang="it-IT" altLang="it-IT" dirty="0" err="1"/>
-              <a:t>cook</a:t>
-            </a:r>
-            <a:r>
-              <a:rPr lang="it-IT" altLang="it-IT" dirty="0"/>
-              <a:t> </a:t>
-            </a:r>
-            <a:r>
-              <a:rPr lang="it-IT" altLang="it-IT" dirty="0" err="1"/>
-              <a:t>it</a:t>
-            </a:r>
-            <a:r>
-              <a:rPr lang="it-IT" altLang="it-IT" dirty="0"/>
-              <a:t> ... </a:t>
-            </a:r>
+            <a:endParaRPr lang="it-IT" altLang="it-IT" dirty="0"/>
           </a:p>
           <a:p>
             <a:pPr marL="0" indent="0">
@@ -12027,7 +13066,7 @@
 </p:sld>
 </file>
 
-<file path=ppt/slides/slide6.xml><?xml version="1.0" encoding="utf-8"?>
+<file path=ppt/slides/slide7.xml><?xml version="1.0" encoding="utf-8"?>
 <p:sld xmlns:a="http://schemas.openxmlformats.org/drawingml/2006/main" xmlns:r="http://schemas.openxmlformats.org/officeDocument/2006/relationships" xmlns:p="http://schemas.openxmlformats.org/presentationml/2006/main">
   <p:cSld>
     <p:spTree>
@@ -14030,241 +15069,6 @@
 </p:sld>
 </file>
 
-<file path=ppt/slides/slide7.xml><?xml version="1.0" encoding="utf-8"?>
-<p:sld xmlns:a="http://schemas.openxmlformats.org/drawingml/2006/main" xmlns:r="http://schemas.openxmlformats.org/officeDocument/2006/relationships" xmlns:p="http://schemas.openxmlformats.org/presentationml/2006/main">
-  <p:cSld>
-    <p:spTree>
-      <p:nvGrpSpPr>
-        <p:cNvPr id="1" name=""/>
-        <p:cNvGrpSpPr/>
-        <p:nvPr/>
-      </p:nvGrpSpPr>
-      <p:grpSpPr>
-        <a:xfrm>
-          <a:off x="0" y="0"/>
-          <a:ext cx="0" cy="0"/>
-          <a:chOff x="0" y="0"/>
-          <a:chExt cx="0" cy="0"/>
-        </a:xfrm>
-      </p:grpSpPr>
-      <p:sp>
-        <p:nvSpPr>
-          <p:cNvPr id="2" name="Titolo 1"/>
-          <p:cNvSpPr>
-            <a:spLocks noGrp="1"/>
-          </p:cNvSpPr>
-          <p:nvPr>
-            <p:ph type="title"/>
-          </p:nvPr>
-        </p:nvSpPr>
-        <p:spPr/>
-        <p:txBody>
-          <a:bodyPr/>
-          <a:lstStyle/>
-          <a:p>
-            <a:r>
-              <a:rPr lang="it-IT" dirty="0" err="1"/>
-              <a:t>Survey</a:t>
-            </a:r>
-            <a:endParaRPr lang="it-IT" dirty="0"/>
-          </a:p>
-        </p:txBody>
-      </p:sp>
-      <p:sp>
-        <p:nvSpPr>
-          <p:cNvPr id="3" name="Segnaposto contenuto 2"/>
-          <p:cNvSpPr>
-            <a:spLocks noGrp="1"/>
-          </p:cNvSpPr>
-          <p:nvPr>
-            <p:ph idx="1"/>
-          </p:nvPr>
-        </p:nvSpPr>
-        <p:spPr/>
-        <p:txBody>
-          <a:bodyPr/>
-          <a:lstStyle/>
-          <a:p>
-            <a:pPr marL="0" indent="0">
-              <a:buNone/>
-            </a:pPr>
-            <a:r>
-              <a:rPr lang="it-IT" dirty="0"/>
-              <a:t>1.How </a:t>
-            </a:r>
-            <a:r>
-              <a:rPr lang="it-IT" dirty="0" err="1"/>
-              <a:t>old</a:t>
-            </a:r>
-            <a:r>
-              <a:rPr lang="it-IT" dirty="0"/>
-              <a:t> are </a:t>
-            </a:r>
-            <a:r>
-              <a:rPr lang="it-IT" dirty="0" err="1"/>
-              <a:t>you</a:t>
-            </a:r>
-            <a:r>
-              <a:rPr lang="it-IT" dirty="0"/>
-              <a:t>?  </a:t>
-            </a:r>
-          </a:p>
-          <a:p>
-            <a:pPr marL="0" indent="0">
-              <a:buNone/>
-            </a:pPr>
-            <a:r>
-              <a:rPr lang="it-IT" dirty="0"/>
-              <a:t>2.</a:t>
-            </a:r>
-            <a:r>
-              <a:rPr lang="en-US" dirty="0"/>
-              <a:t>How much time do you spend to cook</a:t>
-            </a:r>
-            <a:r>
-              <a:rPr lang="it-IT" dirty="0"/>
-              <a:t>?</a:t>
-            </a:r>
-          </a:p>
-          <a:p>
-            <a:pPr marL="0" indent="0">
-              <a:buNone/>
-            </a:pPr>
-            <a:r>
-              <a:rPr lang="it-IT" dirty="0"/>
-              <a:t>3.H</a:t>
-            </a:r>
-            <a:r>
-              <a:rPr lang="it-IT" altLang="it-IT" dirty="0"/>
-              <a:t>ow long </a:t>
-            </a:r>
-            <a:r>
-              <a:rPr lang="it-IT" altLang="it-IT" dirty="0" err="1"/>
-              <a:t>would</a:t>
-            </a:r>
-            <a:r>
-              <a:rPr lang="it-IT" altLang="it-IT" dirty="0"/>
-              <a:t> </a:t>
-            </a:r>
-            <a:r>
-              <a:rPr lang="it-IT" altLang="it-IT" dirty="0" err="1"/>
-              <a:t>you</a:t>
-            </a:r>
-            <a:r>
-              <a:rPr lang="it-IT" altLang="it-IT" dirty="0"/>
-              <a:t> </a:t>
-            </a:r>
-            <a:r>
-              <a:rPr lang="it-IT" altLang="it-IT" dirty="0" err="1"/>
-              <a:t>like</a:t>
-            </a:r>
-            <a:r>
-              <a:rPr lang="it-IT" altLang="it-IT" dirty="0"/>
-              <a:t> to </a:t>
-            </a:r>
-            <a:r>
-              <a:rPr lang="it-IT" altLang="it-IT" dirty="0" err="1"/>
-              <a:t>spend</a:t>
-            </a:r>
-            <a:r>
-              <a:rPr lang="it-IT" altLang="it-IT" dirty="0"/>
-              <a:t> on </a:t>
-            </a:r>
-            <a:r>
-              <a:rPr lang="it-IT" altLang="it-IT" dirty="0" err="1"/>
-              <a:t>cooking</a:t>
-            </a:r>
-            <a:r>
-              <a:rPr lang="it-IT" altLang="it-IT" dirty="0"/>
-              <a:t>?</a:t>
-            </a:r>
-          </a:p>
-          <a:p>
-            <a:pPr marL="0" indent="0">
-              <a:buNone/>
-            </a:pPr>
-            <a:r>
-              <a:rPr lang="it-IT" altLang="it-IT" dirty="0"/>
-              <a:t>4.Do </a:t>
-            </a:r>
-            <a:r>
-              <a:rPr lang="it-IT" altLang="it-IT" dirty="0" err="1"/>
-              <a:t>you</a:t>
-            </a:r>
-            <a:r>
-              <a:rPr lang="it-IT" altLang="it-IT" dirty="0"/>
-              <a:t> </a:t>
-            </a:r>
-            <a:r>
-              <a:rPr lang="it-IT" altLang="it-IT" dirty="0" err="1"/>
-              <a:t>have</a:t>
-            </a:r>
-            <a:r>
-              <a:rPr lang="it-IT" altLang="it-IT" dirty="0"/>
-              <a:t> </a:t>
-            </a:r>
-            <a:r>
-              <a:rPr lang="it-IT" altLang="it-IT" dirty="0" err="1"/>
-              <a:t>imagination</a:t>
-            </a:r>
-            <a:r>
-              <a:rPr lang="it-IT" altLang="it-IT" dirty="0"/>
-              <a:t> in the </a:t>
-            </a:r>
-            <a:r>
-              <a:rPr lang="it-IT" altLang="it-IT" dirty="0" err="1"/>
-              <a:t>kitchen</a:t>
-            </a:r>
-            <a:r>
-              <a:rPr lang="it-IT" altLang="it-IT" dirty="0"/>
-              <a:t>? </a:t>
-            </a:r>
-          </a:p>
-          <a:p>
-            <a:pPr marL="0" indent="0">
-              <a:buNone/>
-            </a:pPr>
-            <a:r>
-              <a:rPr lang="it-IT" altLang="it-IT" dirty="0"/>
-              <a:t>5.</a:t>
-            </a:r>
-            <a:r>
-              <a:rPr lang="en-US" altLang="it-IT" dirty="0"/>
-              <a:t>W</a:t>
-            </a:r>
-            <a:r>
-              <a:rPr lang="en-US" dirty="0"/>
-              <a:t>hat you are looking for in a kitchen app?</a:t>
-            </a:r>
-            <a:endParaRPr lang="it-IT" altLang="it-IT" dirty="0"/>
-          </a:p>
-          <a:p>
-            <a:pPr marL="0" indent="0">
-              <a:buNone/>
-            </a:pPr>
-            <a:endParaRPr lang="it-IT" altLang="it-IT" dirty="0"/>
-          </a:p>
-          <a:p>
-            <a:pPr marL="0" indent="0">
-              <a:buNone/>
-            </a:pPr>
-            <a:endParaRPr lang="it-IT" dirty="0"/>
-          </a:p>
-        </p:txBody>
-      </p:sp>
-    </p:spTree>
-    <p:extLst>
-      <p:ext uri="{BB962C8B-B14F-4D97-AF65-F5344CB8AC3E}">
-        <p14:creationId xmlns:p14="http://schemas.microsoft.com/office/powerpoint/2010/main" val="277675616"/>
-      </p:ext>
-    </p:extLst>
-  </p:cSld>
-  <p:clrMapOvr>
-    <a:masterClrMapping/>
-  </p:clrMapOvr>
-</p:sld>
-</file>
-
 <file path=ppt/slides/slide8.xml><?xml version="1.0" encoding="utf-8"?>
 <p:sld xmlns:a="http://schemas.openxmlformats.org/drawingml/2006/main" xmlns:r="http://schemas.openxmlformats.org/officeDocument/2006/relationships" xmlns:p="http://schemas.openxmlformats.org/presentationml/2006/main">
   <p:cSld>
@@ -14364,7 +15168,7 @@
     </p:spTree>
     <p:extLst>
       <p:ext uri="{BB962C8B-B14F-4D97-AF65-F5344CB8AC3E}">
-        <p14:creationId xmlns:p14="http://schemas.microsoft.com/office/powerpoint/2010/main" val="703374312"/>
+        <p14:creationId xmlns:p14="http://schemas.microsoft.com/office/powerpoint/2010/main" val="2078206402"/>
       </p:ext>
     </p:extLst>
   </p:cSld>
@@ -14477,7 +15281,7 @@
     </p:spTree>
     <p:extLst>
       <p:ext uri="{BB962C8B-B14F-4D97-AF65-F5344CB8AC3E}">
-        <p14:creationId xmlns:p14="http://schemas.microsoft.com/office/powerpoint/2010/main" val="3352610769"/>
+        <p14:creationId xmlns:p14="http://schemas.microsoft.com/office/powerpoint/2010/main" val="4019736202"/>
       </p:ext>
     </p:extLst>
   </p:cSld>

</xml_diff>